<commit_message>
updating the slides for pair prog day
</commit_message>
<xml_diff>
--- a/ClassMaterials/PairProgrammingAndSourceControl/Part1-PairProgramming.pptx
+++ b/ClassMaterials/PairProgrammingAndSourceControl/Part1-PairProgramming.pptx
@@ -228,7 +228,7 @@
           <a:p>
             <a:fld id="{28F7D565-3278-47FB-82CB-054B8DCFC962}" type="datetimeFigureOut">
               <a:rPr lang="en-US" smtClean="0"/>
-              <a:t>2/26/2024</a:t>
+              <a:t>4/30/2024</a:t>
             </a:fld>
             <a:endParaRPr lang="en-US"/>
           </a:p>
@@ -1117,7 +1117,7 @@
           <a:p>
             <a:fld id="{846CE7D5-CF57-46EF-B807-FDD0502418D4}" type="datetimeFigureOut">
               <a:rPr lang="en-US" smtClean="0"/>
-              <a:t>2/26/2024</a:t>
+              <a:t>4/30/2024</a:t>
             </a:fld>
             <a:endParaRPr lang="en-US"/>
           </a:p>
@@ -1287,7 +1287,7 @@
           <a:p>
             <a:fld id="{846CE7D5-CF57-46EF-B807-FDD0502418D4}" type="datetimeFigureOut">
               <a:rPr lang="en-US" smtClean="0"/>
-              <a:t>2/26/2024</a:t>
+              <a:t>4/30/2024</a:t>
             </a:fld>
             <a:endParaRPr lang="en-US"/>
           </a:p>
@@ -1467,7 +1467,7 @@
           <a:p>
             <a:fld id="{846CE7D5-CF57-46EF-B807-FDD0502418D4}" type="datetimeFigureOut">
               <a:rPr lang="en-US" smtClean="0"/>
-              <a:t>2/26/2024</a:t>
+              <a:t>4/30/2024</a:t>
             </a:fld>
             <a:endParaRPr lang="en-US"/>
           </a:p>
@@ -1637,7 +1637,7 @@
           <a:p>
             <a:fld id="{846CE7D5-CF57-46EF-B807-FDD0502418D4}" type="datetimeFigureOut">
               <a:rPr lang="en-US" smtClean="0"/>
-              <a:t>2/26/2024</a:t>
+              <a:t>4/30/2024</a:t>
             </a:fld>
             <a:endParaRPr lang="en-US"/>
           </a:p>
@@ -1883,7 +1883,7 @@
           <a:p>
             <a:fld id="{846CE7D5-CF57-46EF-B807-FDD0502418D4}" type="datetimeFigureOut">
               <a:rPr lang="en-US" smtClean="0"/>
-              <a:t>2/26/2024</a:t>
+              <a:t>4/30/2024</a:t>
             </a:fld>
             <a:endParaRPr lang="en-US"/>
           </a:p>
@@ -2115,7 +2115,7 @@
           <a:p>
             <a:fld id="{846CE7D5-CF57-46EF-B807-FDD0502418D4}" type="datetimeFigureOut">
               <a:rPr lang="en-US" smtClean="0"/>
-              <a:t>2/26/2024</a:t>
+              <a:t>4/30/2024</a:t>
             </a:fld>
             <a:endParaRPr lang="en-US"/>
           </a:p>
@@ -2482,7 +2482,7 @@
           <a:p>
             <a:fld id="{846CE7D5-CF57-46EF-B807-FDD0502418D4}" type="datetimeFigureOut">
               <a:rPr lang="en-US" smtClean="0"/>
-              <a:t>2/26/2024</a:t>
+              <a:t>4/30/2024</a:t>
             </a:fld>
             <a:endParaRPr lang="en-US"/>
           </a:p>
@@ -2600,7 +2600,7 @@
           <a:p>
             <a:fld id="{846CE7D5-CF57-46EF-B807-FDD0502418D4}" type="datetimeFigureOut">
               <a:rPr lang="en-US" smtClean="0"/>
-              <a:t>2/26/2024</a:t>
+              <a:t>4/30/2024</a:t>
             </a:fld>
             <a:endParaRPr lang="en-US"/>
           </a:p>
@@ -2695,7 +2695,7 @@
           <a:p>
             <a:fld id="{846CE7D5-CF57-46EF-B807-FDD0502418D4}" type="datetimeFigureOut">
               <a:rPr lang="en-US" smtClean="0"/>
-              <a:t>2/26/2024</a:t>
+              <a:t>4/30/2024</a:t>
             </a:fld>
             <a:endParaRPr lang="en-US"/>
           </a:p>
@@ -2972,7 +2972,7 @@
           <a:p>
             <a:fld id="{846CE7D5-CF57-46EF-B807-FDD0502418D4}" type="datetimeFigureOut">
               <a:rPr lang="en-US" smtClean="0"/>
-              <a:t>2/26/2024</a:t>
+              <a:t>4/30/2024</a:t>
             </a:fld>
             <a:endParaRPr lang="en-US"/>
           </a:p>
@@ -3229,7 +3229,7 @@
           <a:p>
             <a:fld id="{846CE7D5-CF57-46EF-B807-FDD0502418D4}" type="datetimeFigureOut">
               <a:rPr lang="en-US" smtClean="0"/>
-              <a:t>2/26/2024</a:t>
+              <a:t>4/30/2024</a:t>
             </a:fld>
             <a:endParaRPr lang="en-US"/>
           </a:p>
@@ -3442,7 +3442,7 @@
           <a:p>
             <a:fld id="{846CE7D5-CF57-46EF-B807-FDD0502418D4}" type="datetimeFigureOut">
               <a:rPr lang="en-US" smtClean="0"/>
-              <a:t>2/26/2024</a:t>
+              <a:t>4/30/2024</a:t>
             </a:fld>
             <a:endParaRPr lang="en-US"/>
           </a:p>
@@ -3909,7 +3909,7 @@
         </p:nvSpPr>
         <p:spPr>
           <a:xfrm>
-            <a:off x="3185175" y="5045354"/>
+            <a:off x="313453" y="5045354"/>
             <a:ext cx="5233187" cy="369332"/>
           </a:xfrm>
           <a:prstGeom prst="rect">
@@ -3986,13 +3986,18 @@
           </a:p>
           <a:p>
             <a:r>
-              <a:rPr lang="en-US" sz="4400" dirty="0">
+              <a:rPr lang="en-US" sz="4400">
                 <a:highlight>
                   <a:srgbClr val="FFFF00"/>
                 </a:highlight>
               </a:rPr>
-              <a:t>___________</a:t>
-            </a:r>
+              <a:t>_________</a:t>
+            </a:r>
+            <a:endParaRPr lang="en-US" sz="4400" dirty="0">
+              <a:highlight>
+                <a:srgbClr val="FFFF00"/>
+              </a:highlight>
+            </a:endParaRPr>
           </a:p>
         </p:txBody>
       </p:sp>
@@ -4040,8 +4045,8 @@
         </p:nvSpPr>
         <p:spPr>
           <a:xfrm>
-            <a:off x="2366682" y="5608324"/>
-            <a:ext cx="6605195" cy="646331"/>
+            <a:off x="313453" y="5890711"/>
+            <a:ext cx="3194857" cy="646331"/>
           </a:xfrm>
           <a:prstGeom prst="rect">
             <a:avLst/>
@@ -4058,11 +4063,41 @@
           <a:p>
             <a:r>
               <a:rPr lang="en-US" sz="3600" dirty="0"/>
-              <a:t>Quiz Today? Maybe…</a:t>
-            </a:r>
-          </a:p>
-        </p:txBody>
-      </p:sp>
+              <a:t>No Quiz Today</a:t>
+            </a:r>
+          </a:p>
+        </p:txBody>
+      </p:sp>
+      <p:pic>
+        <p:nvPicPr>
+          <p:cNvPr id="8" name="Picture 7">
+            <a:extLst>
+              <a:ext uri="{FF2B5EF4-FFF2-40B4-BE49-F238E27FC236}">
+                <a16:creationId xmlns:a16="http://schemas.microsoft.com/office/drawing/2014/main" id="{271A2BF9-6017-D7A6-3C36-CFD7C4553191}"/>
+              </a:ext>
+            </a:extLst>
+          </p:cNvPr>
+          <p:cNvPicPr>
+            <a:picLocks noChangeAspect="1"/>
+          </p:cNvPicPr>
+          <p:nvPr/>
+        </p:nvPicPr>
+        <p:blipFill>
+          <a:blip r:embed="rId4"/>
+          <a:stretch>
+            <a:fillRect/>
+          </a:stretch>
+        </p:blipFill>
+        <p:spPr>
+          <a:xfrm>
+            <a:off x="6096000" y="4286944"/>
+            <a:ext cx="5993457" cy="2571056"/>
+          </a:xfrm>
+          <a:prstGeom prst="rect">
+            <a:avLst/>
+          </a:prstGeom>
+        </p:spPr>
+      </p:pic>
     </p:spTree>
     <p:extLst>
       <p:ext uri="{BB962C8B-B14F-4D97-AF65-F5344CB8AC3E}">
@@ -5436,7 +5471,7 @@
         </p:nvSpPr>
         <p:spPr>
           <a:xfrm>
-            <a:off x="295759" y="1306431"/>
+            <a:off x="310722" y="1306431"/>
             <a:ext cx="11599189" cy="5303596"/>
           </a:xfrm>
         </p:spPr>
@@ -5497,6 +5532,79 @@
             <a:r>
               <a:rPr lang="en-US" dirty="0"/>
               <a:t>Have Fun – Working with someone else can be a lot more fun!</a:t>
+            </a:r>
+          </a:p>
+        </p:txBody>
+      </p:sp>
+      <p:pic>
+        <p:nvPicPr>
+          <p:cNvPr id="5" name="Picture 4" descr="A black numbers on a white background&#10;&#10;Description automatically generated">
+            <a:extLst>
+              <a:ext uri="{FF2B5EF4-FFF2-40B4-BE49-F238E27FC236}">
+                <a16:creationId xmlns:a16="http://schemas.microsoft.com/office/drawing/2014/main" id="{C3F15D6B-B0E4-C223-CA05-8BF8E052DCBD}"/>
+              </a:ext>
+            </a:extLst>
+          </p:cNvPr>
+          <p:cNvPicPr>
+            <a:picLocks noChangeAspect="1"/>
+          </p:cNvPicPr>
+          <p:nvPr/>
+        </p:nvPicPr>
+        <p:blipFill>
+          <a:blip r:embed="rId3">
+            <a:extLst>
+              <a:ext uri="{28A0092B-C50C-407E-A947-70E740481C1C}">
+                <a14:useLocalDpi xmlns:a14="http://schemas.microsoft.com/office/drawing/2010/main" val="0"/>
+              </a:ext>
+            </a:extLst>
+          </a:blip>
+          <a:stretch>
+            <a:fillRect/>
+          </a:stretch>
+        </p:blipFill>
+        <p:spPr>
+          <a:xfrm>
+            <a:off x="9671124" y="5809418"/>
+            <a:ext cx="2464185" cy="985674"/>
+          </a:xfrm>
+          <a:prstGeom prst="rect">
+            <a:avLst/>
+          </a:prstGeom>
+        </p:spPr>
+      </p:pic>
+      <p:sp>
+        <p:nvSpPr>
+          <p:cNvPr id="6" name="TextBox 5">
+            <a:extLst>
+              <a:ext uri="{FF2B5EF4-FFF2-40B4-BE49-F238E27FC236}">
+                <a16:creationId xmlns:a16="http://schemas.microsoft.com/office/drawing/2014/main" id="{6194BF7E-CFCC-BBEC-6304-5D5C11E21795}"/>
+              </a:ext>
+            </a:extLst>
+          </p:cNvPr>
+          <p:cNvSpPr txBox="1"/>
+          <p:nvPr/>
+        </p:nvSpPr>
+        <p:spPr>
+          <a:xfrm>
+            <a:off x="690966" y="6086807"/>
+            <a:ext cx="8696875" cy="523220"/>
+          </a:xfrm>
+          <a:prstGeom prst="rect">
+            <a:avLst/>
+          </a:prstGeom>
+          <a:solidFill>
+            <a:srgbClr val="92D050"/>
+          </a:solidFill>
+        </p:spPr>
+        <p:txBody>
+          <a:bodyPr wrap="square" rtlCol="0">
+            <a:spAutoFit/>
+          </a:bodyPr>
+          <a:lstStyle/>
+          <a:p>
+            <a:r>
+              <a:rPr lang="en-US" sz="2800" dirty="0"/>
+              <a:t>Discuss as a team: How well have you done these so far?</a:t>
             </a:r>
           </a:p>
         </p:txBody>
@@ -5658,6 +5766,79 @@
               <a:t> to do</a:t>
             </a:r>
             <a:endParaRPr lang="en-US" sz="8000" b="1" dirty="0"/>
+          </a:p>
+        </p:txBody>
+      </p:sp>
+      <p:pic>
+        <p:nvPicPr>
+          <p:cNvPr id="4" name="Picture 3" descr="A black numbers on a white background&#10;&#10;Description automatically generated">
+            <a:extLst>
+              <a:ext uri="{FF2B5EF4-FFF2-40B4-BE49-F238E27FC236}">
+                <a16:creationId xmlns:a16="http://schemas.microsoft.com/office/drawing/2014/main" id="{677B0BBD-1883-6EBD-2B53-853F061E996C}"/>
+              </a:ext>
+            </a:extLst>
+          </p:cNvPr>
+          <p:cNvPicPr>
+            <a:picLocks noChangeAspect="1"/>
+          </p:cNvPicPr>
+          <p:nvPr/>
+        </p:nvPicPr>
+        <p:blipFill>
+          <a:blip r:embed="rId3">
+            <a:extLst>
+              <a:ext uri="{28A0092B-C50C-407E-A947-70E740481C1C}">
+                <a14:useLocalDpi xmlns:a14="http://schemas.microsoft.com/office/drawing/2010/main" val="0"/>
+              </a:ext>
+            </a:extLst>
+          </a:blip>
+          <a:stretch>
+            <a:fillRect/>
+          </a:stretch>
+        </p:blipFill>
+        <p:spPr>
+          <a:xfrm>
+            <a:off x="8982635" y="5547250"/>
+            <a:ext cx="3005304" cy="1202122"/>
+          </a:xfrm>
+          <a:prstGeom prst="rect">
+            <a:avLst/>
+          </a:prstGeom>
+        </p:spPr>
+      </p:pic>
+      <p:sp>
+        <p:nvSpPr>
+          <p:cNvPr id="6" name="TextBox 5">
+            <a:extLst>
+              <a:ext uri="{FF2B5EF4-FFF2-40B4-BE49-F238E27FC236}">
+                <a16:creationId xmlns:a16="http://schemas.microsoft.com/office/drawing/2014/main" id="{59B6A129-FE3E-B311-5621-ED4BD45B7D9B}"/>
+              </a:ext>
+            </a:extLst>
+          </p:cNvPr>
+          <p:cNvSpPr txBox="1"/>
+          <p:nvPr/>
+        </p:nvSpPr>
+        <p:spPr>
+          <a:xfrm>
+            <a:off x="204061" y="5660010"/>
+            <a:ext cx="8696875" cy="954107"/>
+          </a:xfrm>
+          <a:prstGeom prst="rect">
+            <a:avLst/>
+          </a:prstGeom>
+          <a:solidFill>
+            <a:srgbClr val="92D050"/>
+          </a:solidFill>
+        </p:spPr>
+        <p:txBody>
+          <a:bodyPr wrap="square" rtlCol="0">
+            <a:spAutoFit/>
+          </a:bodyPr>
+          <a:lstStyle/>
+          <a:p>
+            <a:r>
+              <a:rPr lang="en-US" sz="2800" dirty="0"/>
+              <a:t>Discuss as a team: Have you had any bad experiences related to these in a team in the past?</a:t>
+            </a:r>
           </a:p>
         </p:txBody>
       </p:sp>

</xml_diff>

<commit_message>
updating instructions to install platuml plugin
</commit_message>
<xml_diff>
--- a/ClassMaterials/PairProgrammingAndSourceControl/Part1-PairProgramming.pptx
+++ b/ClassMaterials/PairProgrammingAndSourceControl/Part1-PairProgramming.pptx
@@ -228,7 +228,7 @@
           <a:p>
             <a:fld id="{28F7D565-3278-47FB-82CB-054B8DCFC962}" type="datetimeFigureOut">
               <a:rPr lang="en-US" smtClean="0"/>
-              <a:t>5/4/2025</a:t>
+              <a:t>5/6/2025</a:t>
             </a:fld>
             <a:endParaRPr lang="en-US"/>
           </a:p>
@@ -1117,7 +1117,7 @@
           <a:p>
             <a:fld id="{846CE7D5-CF57-46EF-B807-FDD0502418D4}" type="datetimeFigureOut">
               <a:rPr lang="en-US" smtClean="0"/>
-              <a:t>5/4/2025</a:t>
+              <a:t>5/6/2025</a:t>
             </a:fld>
             <a:endParaRPr lang="en-US"/>
           </a:p>
@@ -1287,7 +1287,7 @@
           <a:p>
             <a:fld id="{846CE7D5-CF57-46EF-B807-FDD0502418D4}" type="datetimeFigureOut">
               <a:rPr lang="en-US" smtClean="0"/>
-              <a:t>5/4/2025</a:t>
+              <a:t>5/6/2025</a:t>
             </a:fld>
             <a:endParaRPr lang="en-US"/>
           </a:p>
@@ -1467,7 +1467,7 @@
           <a:p>
             <a:fld id="{846CE7D5-CF57-46EF-B807-FDD0502418D4}" type="datetimeFigureOut">
               <a:rPr lang="en-US" smtClean="0"/>
-              <a:t>5/4/2025</a:t>
+              <a:t>5/6/2025</a:t>
             </a:fld>
             <a:endParaRPr lang="en-US"/>
           </a:p>
@@ -1637,7 +1637,7 @@
           <a:p>
             <a:fld id="{846CE7D5-CF57-46EF-B807-FDD0502418D4}" type="datetimeFigureOut">
               <a:rPr lang="en-US" smtClean="0"/>
-              <a:t>5/4/2025</a:t>
+              <a:t>5/6/2025</a:t>
             </a:fld>
             <a:endParaRPr lang="en-US"/>
           </a:p>
@@ -1883,7 +1883,7 @@
           <a:p>
             <a:fld id="{846CE7D5-CF57-46EF-B807-FDD0502418D4}" type="datetimeFigureOut">
               <a:rPr lang="en-US" smtClean="0"/>
-              <a:t>5/4/2025</a:t>
+              <a:t>5/6/2025</a:t>
             </a:fld>
             <a:endParaRPr lang="en-US"/>
           </a:p>
@@ -2115,7 +2115,7 @@
           <a:p>
             <a:fld id="{846CE7D5-CF57-46EF-B807-FDD0502418D4}" type="datetimeFigureOut">
               <a:rPr lang="en-US" smtClean="0"/>
-              <a:t>5/4/2025</a:t>
+              <a:t>5/6/2025</a:t>
             </a:fld>
             <a:endParaRPr lang="en-US"/>
           </a:p>
@@ -2482,7 +2482,7 @@
           <a:p>
             <a:fld id="{846CE7D5-CF57-46EF-B807-FDD0502418D4}" type="datetimeFigureOut">
               <a:rPr lang="en-US" smtClean="0"/>
-              <a:t>5/4/2025</a:t>
+              <a:t>5/6/2025</a:t>
             </a:fld>
             <a:endParaRPr lang="en-US"/>
           </a:p>
@@ -2600,7 +2600,7 @@
           <a:p>
             <a:fld id="{846CE7D5-CF57-46EF-B807-FDD0502418D4}" type="datetimeFigureOut">
               <a:rPr lang="en-US" smtClean="0"/>
-              <a:t>5/4/2025</a:t>
+              <a:t>5/6/2025</a:t>
             </a:fld>
             <a:endParaRPr lang="en-US"/>
           </a:p>
@@ -2695,7 +2695,7 @@
           <a:p>
             <a:fld id="{846CE7D5-CF57-46EF-B807-FDD0502418D4}" type="datetimeFigureOut">
               <a:rPr lang="en-US" smtClean="0"/>
-              <a:t>5/4/2025</a:t>
+              <a:t>5/6/2025</a:t>
             </a:fld>
             <a:endParaRPr lang="en-US"/>
           </a:p>
@@ -2972,7 +2972,7 @@
           <a:p>
             <a:fld id="{846CE7D5-CF57-46EF-B807-FDD0502418D4}" type="datetimeFigureOut">
               <a:rPr lang="en-US" smtClean="0"/>
-              <a:t>5/4/2025</a:t>
+              <a:t>5/6/2025</a:t>
             </a:fld>
             <a:endParaRPr lang="en-US"/>
           </a:p>
@@ -3229,7 +3229,7 @@
           <a:p>
             <a:fld id="{846CE7D5-CF57-46EF-B807-FDD0502418D4}" type="datetimeFigureOut">
               <a:rPr lang="en-US" smtClean="0"/>
-              <a:t>5/4/2025</a:t>
+              <a:t>5/6/2025</a:t>
             </a:fld>
             <a:endParaRPr lang="en-US"/>
           </a:p>
@@ -3442,7 +3442,7 @@
           <a:p>
             <a:fld id="{846CE7D5-CF57-46EF-B807-FDD0502418D4}" type="datetimeFigureOut">
               <a:rPr lang="en-US" smtClean="0"/>
-              <a:t>5/4/2025</a:t>
+              <a:t>5/6/2025</a:t>
             </a:fld>
             <a:endParaRPr lang="en-US"/>
           </a:p>
@@ -3859,7 +3859,7 @@
         </p:nvSpPr>
         <p:spPr>
           <a:xfrm>
-            <a:off x="441649" y="2036763"/>
+            <a:off x="0" y="1328057"/>
             <a:ext cx="9144000" cy="2387600"/>
           </a:xfrm>
         </p:spPr>
@@ -3901,66 +3901,6 @@
           </a:p>
         </p:txBody>
       </p:sp>
-      <p:pic>
-        <p:nvPicPr>
-          <p:cNvPr id="5" name="Picture 4">
-            <a:extLst>
-              <a:ext uri="{FF2B5EF4-FFF2-40B4-BE49-F238E27FC236}">
-                <a16:creationId xmlns:a16="http://schemas.microsoft.com/office/drawing/2014/main" id="{B187155F-77EA-4C4B-CDF0-D769B8A13F0D}"/>
-              </a:ext>
-            </a:extLst>
-          </p:cNvPr>
-          <p:cNvPicPr>
-            <a:picLocks noChangeAspect="1"/>
-          </p:cNvPicPr>
-          <p:nvPr/>
-        </p:nvPicPr>
-        <p:blipFill>
-          <a:blip r:embed="rId3"/>
-          <a:stretch>
-            <a:fillRect/>
-          </a:stretch>
-        </p:blipFill>
-        <p:spPr>
-          <a:xfrm>
-            <a:off x="9661847" y="1056433"/>
-            <a:ext cx="2429435" cy="2103869"/>
-          </a:xfrm>
-          <a:prstGeom prst="rect">
-            <a:avLst/>
-          </a:prstGeom>
-        </p:spPr>
-      </p:pic>
-      <p:pic>
-        <p:nvPicPr>
-          <p:cNvPr id="8" name="Picture 7">
-            <a:extLst>
-              <a:ext uri="{FF2B5EF4-FFF2-40B4-BE49-F238E27FC236}">
-                <a16:creationId xmlns:a16="http://schemas.microsoft.com/office/drawing/2014/main" id="{271A2BF9-6017-D7A6-3C36-CFD7C4553191}"/>
-              </a:ext>
-            </a:extLst>
-          </p:cNvPr>
-          <p:cNvPicPr>
-            <a:picLocks noChangeAspect="1"/>
-          </p:cNvPicPr>
-          <p:nvPr/>
-        </p:nvPicPr>
-        <p:blipFill>
-          <a:blip r:embed="rId4"/>
-          <a:stretch>
-            <a:fillRect/>
-          </a:stretch>
-        </p:blipFill>
-        <p:spPr>
-          <a:xfrm>
-            <a:off x="6096000" y="4286944"/>
-            <a:ext cx="5993457" cy="2571056"/>
-          </a:xfrm>
-          <a:prstGeom prst="rect">
-            <a:avLst/>
-          </a:prstGeom>
-        </p:spPr>
-      </p:pic>
       <p:sp>
         <p:nvSpPr>
           <p:cNvPr id="7" name="Shape 54">

</xml_diff>